<commit_message>
Updated Lab 1 and finalized Lab 2
</commit_message>
<xml_diff>
--- a/Module 1/Operation Remote Resupply, Part 1.pptx
+++ b/Module 1/Operation Remote Resupply, Part 1.pptx
@@ -208,7 +208,7 @@
           <a:p>
             <a:fld id="{9EEC8498-F959-41D6-B2E1-A4DAD84D50F5}" type="datetimeFigureOut">
               <a:rPr lang="en-US" smtClean="0"/>
-              <a:t>4/24/2017</a:t>
+              <a:t>4/27/2017</a:t>
             </a:fld>
             <a:endParaRPr lang="en-US"/>
           </a:p>
@@ -1652,7 +1652,7 @@
           <a:p>
             <a:fld id="{C5CFB798-4527-4C1E-8778-A24776287903}" type="datetimeFigureOut">
               <a:rPr lang="en-US" smtClean="0"/>
-              <a:t>4/24/2017</a:t>
+              <a:t>4/27/2017</a:t>
             </a:fld>
             <a:endParaRPr lang="en-US"/>
           </a:p>
@@ -1820,7 +1820,7 @@
           <a:p>
             <a:fld id="{C5CFB798-4527-4C1E-8778-A24776287903}" type="datetimeFigureOut">
               <a:rPr lang="en-US" smtClean="0"/>
-              <a:t>4/24/2017</a:t>
+              <a:t>4/27/2017</a:t>
             </a:fld>
             <a:endParaRPr lang="en-US"/>
           </a:p>
@@ -1998,7 +1998,7 @@
           <a:p>
             <a:fld id="{C5CFB798-4527-4C1E-8778-A24776287903}" type="datetimeFigureOut">
               <a:rPr lang="en-US" smtClean="0"/>
-              <a:t>4/24/2017</a:t>
+              <a:t>4/27/2017</a:t>
             </a:fld>
             <a:endParaRPr lang="en-US"/>
           </a:p>
@@ -2166,7 +2166,7 @@
           <a:p>
             <a:fld id="{C5CFB798-4527-4C1E-8778-A24776287903}" type="datetimeFigureOut">
               <a:rPr lang="en-US" smtClean="0"/>
-              <a:t>4/24/2017</a:t>
+              <a:t>4/27/2017</a:t>
             </a:fld>
             <a:endParaRPr lang="en-US"/>
           </a:p>
@@ -2411,7 +2411,7 @@
           <a:p>
             <a:fld id="{C5CFB798-4527-4C1E-8778-A24776287903}" type="datetimeFigureOut">
               <a:rPr lang="en-US" smtClean="0"/>
-              <a:t>4/24/2017</a:t>
+              <a:t>4/27/2017</a:t>
             </a:fld>
             <a:endParaRPr lang="en-US"/>
           </a:p>
@@ -2640,7 +2640,7 @@
           <a:p>
             <a:fld id="{C5CFB798-4527-4C1E-8778-A24776287903}" type="datetimeFigureOut">
               <a:rPr lang="en-US" smtClean="0"/>
-              <a:t>4/24/2017</a:t>
+              <a:t>4/27/2017</a:t>
             </a:fld>
             <a:endParaRPr lang="en-US"/>
           </a:p>
@@ -3004,7 +3004,7 @@
           <a:p>
             <a:fld id="{C5CFB798-4527-4C1E-8778-A24776287903}" type="datetimeFigureOut">
               <a:rPr lang="en-US" smtClean="0"/>
-              <a:t>4/24/2017</a:t>
+              <a:t>4/27/2017</a:t>
             </a:fld>
             <a:endParaRPr lang="en-US"/>
           </a:p>
@@ -3121,7 +3121,7 @@
           <a:p>
             <a:fld id="{C5CFB798-4527-4C1E-8778-A24776287903}" type="datetimeFigureOut">
               <a:rPr lang="en-US" smtClean="0"/>
-              <a:t>4/24/2017</a:t>
+              <a:t>4/27/2017</a:t>
             </a:fld>
             <a:endParaRPr lang="en-US"/>
           </a:p>
@@ -3216,7 +3216,7 @@
           <a:p>
             <a:fld id="{C5CFB798-4527-4C1E-8778-A24776287903}" type="datetimeFigureOut">
               <a:rPr lang="en-US" smtClean="0"/>
-              <a:t>4/24/2017</a:t>
+              <a:t>4/27/2017</a:t>
             </a:fld>
             <a:endParaRPr lang="en-US"/>
           </a:p>
@@ -3491,7 +3491,7 @@
           <a:p>
             <a:fld id="{C5CFB798-4527-4C1E-8778-A24776287903}" type="datetimeFigureOut">
               <a:rPr lang="en-US" smtClean="0"/>
-              <a:t>4/24/2017</a:t>
+              <a:t>4/27/2017</a:t>
             </a:fld>
             <a:endParaRPr lang="en-US"/>
           </a:p>
@@ -3743,7 +3743,7 @@
           <a:p>
             <a:fld id="{C5CFB798-4527-4C1E-8778-A24776287903}" type="datetimeFigureOut">
               <a:rPr lang="en-US" smtClean="0"/>
-              <a:t>4/24/2017</a:t>
+              <a:t>4/27/2017</a:t>
             </a:fld>
             <a:endParaRPr lang="en-US"/>
           </a:p>
@@ -3954,7 +3954,7 @@
           <a:p>
             <a:fld id="{C5CFB798-4527-4C1E-8778-A24776287903}" type="datetimeFigureOut">
               <a:rPr lang="en-US" smtClean="0"/>
-              <a:t>4/24/2017</a:t>
+              <a:t>4/27/2017</a:t>
             </a:fld>
             <a:endParaRPr lang="en-US"/>
           </a:p>

</xml_diff>